<commit_message>
plotting with pictures; smart filling report
</commit_message>
<xml_diff>
--- a/bin/TEMPLATE_BOLD_PLACEHOLDERS.pptx
+++ b/bin/TEMPLATE_BOLD_PLACEHOLDERS.pptx
@@ -218,7 +218,7 @@
           <a:p>
             <a:fld id="{2E9DB196-4E5B-B64B-848D-69F7B54B86BB}" type="datetimeFigureOut">
               <a:rPr lang="en-US" smtClean="0"/>
-              <a:t>8/4/20</a:t>
+              <a:t>8/5/20</a:t>
             </a:fld>
             <a:endParaRPr lang="en-US"/>
           </a:p>
@@ -825,7 +825,7 @@
           <a:p>
             <a:fld id="{AFCB438B-53EA-094D-A45F-391681BE2E8A}" type="datetimeFigureOut">
               <a:rPr lang="en-US" smtClean="0"/>
-              <a:t>8/4/20</a:t>
+              <a:t>8/5/20</a:t>
             </a:fld>
             <a:endParaRPr lang="en-US"/>
           </a:p>
@@ -990,7 +990,7 @@
           <a:p>
             <a:fld id="{AFCB438B-53EA-094D-A45F-391681BE2E8A}" type="datetimeFigureOut">
               <a:rPr lang="en-US" smtClean="0"/>
-              <a:t>8/4/20</a:t>
+              <a:t>8/5/20</a:t>
             </a:fld>
             <a:endParaRPr lang="en-US"/>
           </a:p>
@@ -1165,7 +1165,7 @@
           <a:p>
             <a:fld id="{AFCB438B-53EA-094D-A45F-391681BE2E8A}" type="datetimeFigureOut">
               <a:rPr lang="en-US" smtClean="0"/>
-              <a:t>8/4/20</a:t>
+              <a:t>8/5/20</a:t>
             </a:fld>
             <a:endParaRPr lang="en-US"/>
           </a:p>
@@ -1384,7 +1384,7 @@
           <a:p>
             <a:fld id="{AFCB438B-53EA-094D-A45F-391681BE2E8A}" type="datetimeFigureOut">
               <a:rPr lang="en-US" smtClean="0"/>
-              <a:t>8/4/20</a:t>
+              <a:t>8/5/20</a:t>
             </a:fld>
             <a:endParaRPr lang="en-US"/>
           </a:p>
@@ -1623,7 +1623,7 @@
           <a:p>
             <a:fld id="{AFCB438B-53EA-094D-A45F-391681BE2E8A}" type="datetimeFigureOut">
               <a:rPr lang="en-US" smtClean="0"/>
-              <a:t>8/4/20</a:t>
+              <a:t>8/5/20</a:t>
             </a:fld>
             <a:endParaRPr lang="en-US"/>
           </a:p>
@@ -1850,7 +1850,7 @@
           <a:p>
             <a:fld id="{AFCB438B-53EA-094D-A45F-391681BE2E8A}" type="datetimeFigureOut">
               <a:rPr lang="en-US" smtClean="0"/>
-              <a:t>8/4/20</a:t>
+              <a:t>8/5/20</a:t>
             </a:fld>
             <a:endParaRPr lang="en-US"/>
           </a:p>
@@ -2212,7 +2212,7 @@
           <a:p>
             <a:fld id="{AFCB438B-53EA-094D-A45F-391681BE2E8A}" type="datetimeFigureOut">
               <a:rPr lang="en-US" smtClean="0"/>
-              <a:t>8/4/20</a:t>
+              <a:t>8/5/20</a:t>
             </a:fld>
             <a:endParaRPr lang="en-US"/>
           </a:p>
@@ -2325,7 +2325,7 @@
           <a:p>
             <a:fld id="{AFCB438B-53EA-094D-A45F-391681BE2E8A}" type="datetimeFigureOut">
               <a:rPr lang="en-US" smtClean="0"/>
-              <a:t>8/4/20</a:t>
+              <a:t>8/5/20</a:t>
             </a:fld>
             <a:endParaRPr lang="en-US"/>
           </a:p>
@@ -2415,7 +2415,7 @@
           <a:p>
             <a:fld id="{AFCB438B-53EA-094D-A45F-391681BE2E8A}" type="datetimeFigureOut">
               <a:rPr lang="en-US" smtClean="0"/>
-              <a:t>8/4/20</a:t>
+              <a:t>8/5/20</a:t>
             </a:fld>
             <a:endParaRPr lang="en-US"/>
           </a:p>
@@ -2687,7 +2687,7 @@
           <a:p>
             <a:fld id="{AFCB438B-53EA-094D-A45F-391681BE2E8A}" type="datetimeFigureOut">
               <a:rPr lang="en-US" smtClean="0"/>
-              <a:t>8/4/20</a:t>
+              <a:t>8/5/20</a:t>
             </a:fld>
             <a:endParaRPr lang="en-US"/>
           </a:p>
@@ -2939,7 +2939,7 @@
           <a:p>
             <a:fld id="{AFCB438B-53EA-094D-A45F-391681BE2E8A}" type="datetimeFigureOut">
               <a:rPr lang="en-US" smtClean="0"/>
-              <a:t>8/4/20</a:t>
+              <a:t>8/5/20</a:t>
             </a:fld>
             <a:endParaRPr lang="en-US"/>
           </a:p>
@@ -3147,7 +3147,7 @@
           <a:p>
             <a:fld id="{AFCB438B-53EA-094D-A45F-391681BE2E8A}" type="datetimeFigureOut">
               <a:rPr lang="en-US" smtClean="0"/>
-              <a:t>8/4/20</a:t>
+              <a:t>8/5/20</a:t>
             </a:fld>
             <a:endParaRPr lang="en-US"/>
           </a:p>
@@ -3724,8 +3724,8 @@
         </p:nvSpPr>
         <p:spPr>
           <a:xfrm>
-            <a:off x="335280" y="2303793"/>
-            <a:ext cx="9387840" cy="2572499"/>
+            <a:off x="2577619" y="2155517"/>
+            <a:ext cx="1651000" cy="3000821"/>
           </a:xfrm>
           <a:prstGeom prst="rect">
             <a:avLst/>
@@ -3742,7 +3742,7 @@
           </a:bodyPr>
           <a:lstStyle/>
           <a:p>
-            <a:pPr algn="ctr">
+            <a:pPr algn="r">
               <a:spcAft>
                 <a:spcPts val="660"/>
               </a:spcAft>
@@ -3756,24 +3756,22 @@
                 <a:ea typeface="Avenir Book" charset="0"/>
                 <a:cs typeface="Avenir Book" charset="0"/>
               </a:rPr>
-              <a:t>Scan date: </a:t>
+              <a:t>Scan </a:t>
             </a:r>
             <a:r>
               <a:rPr lang="en-US" sz="2200" b="1" dirty="0" smtClean="0">
                 <a:solidFill>
-                  <a:schemeClr val="bg1">
-                    <a:lumMod val="50000"/>
-                  </a:schemeClr>
-                </a:solidFill>
-                <a:latin typeface="Avenir Book" charset="0"/>
-                <a:ea typeface="Avenir Book" charset="0"/>
-                <a:cs typeface="Avenir Book" charset="0"/>
-              </a:rPr>
-              <a:t>##/##/###</a:t>
-            </a:r>
-          </a:p>
-          <a:p>
-            <a:pPr algn="ctr">
+                  <a:srgbClr val="0070C0"/>
+                </a:solidFill>
+                <a:latin typeface="Avenir Book" charset="0"/>
+                <a:ea typeface="Avenir Book" charset="0"/>
+                <a:cs typeface="Avenir Book" charset="0"/>
+              </a:rPr>
+              <a:t>date:</a:t>
+            </a:r>
+          </a:p>
+          <a:p>
+            <a:pPr algn="r">
               <a:spcAft>
                 <a:spcPts val="660"/>
               </a:spcAft>
@@ -3790,7 +3788,7 @@
               <a:t>DOB</a:t>
             </a:r>
             <a:r>
-              <a:rPr lang="en-US" sz="2200" b="1" dirty="0">
+              <a:rPr lang="en-US" sz="2200" b="1" dirty="0" smtClean="0">
                 <a:solidFill>
                   <a:srgbClr val="0070C0"/>
                 </a:solidFill>
@@ -3798,55 +3796,107 @@
                 <a:ea typeface="Avenir Book" charset="0"/>
                 <a:cs typeface="Avenir Book" charset="0"/>
               </a:rPr>
-              <a:t>: </a:t>
-            </a:r>
-            <a:r>
-              <a:rPr lang="en-US" sz="2200" b="1" dirty="0" smtClean="0">
-                <a:solidFill>
-                  <a:schemeClr val="bg1">
-                    <a:lumMod val="50000"/>
-                  </a:schemeClr>
-                </a:solidFill>
-                <a:latin typeface="Avenir Book" charset="0"/>
-                <a:ea typeface="Avenir Book" charset="0"/>
-                <a:cs typeface="Avenir Book" charset="0"/>
-              </a:rPr>
-              <a:t>##/##/#### (## </a:t>
-            </a:r>
-            <a:r>
-              <a:rPr lang="en-US" sz="2200" b="1" dirty="0" err="1">
-                <a:solidFill>
-                  <a:schemeClr val="bg1">
-                    <a:lumMod val="50000"/>
-                  </a:schemeClr>
-                </a:solidFill>
-                <a:latin typeface="Avenir Book" charset="0"/>
-                <a:ea typeface="Avenir Book" charset="0"/>
-                <a:cs typeface="Avenir Book" charset="0"/>
-              </a:rPr>
-              <a:t>y.o</a:t>
-            </a:r>
-            <a:r>
-              <a:rPr lang="en-US" sz="2200" b="1" dirty="0">
-                <a:solidFill>
-                  <a:schemeClr val="bg1">
-                    <a:lumMod val="50000"/>
-                  </a:schemeClr>
-                </a:solidFill>
-                <a:latin typeface="Avenir Book" charset="0"/>
-                <a:ea typeface="Avenir Book" charset="0"/>
-                <a:cs typeface="Avenir Book" charset="0"/>
-              </a:rPr>
-              <a:t>.)</a:t>
-            </a:r>
-          </a:p>
-          <a:p>
-            <a:pPr algn="ctr">
+              <a:t>:</a:t>
+            </a:r>
+          </a:p>
+          <a:p>
+            <a:pPr algn="r">
               <a:spcAft>
                 <a:spcPts val="660"/>
               </a:spcAft>
             </a:pPr>
             <a:r>
+              <a:rPr lang="en-US" sz="2200" b="1" dirty="0" smtClean="0">
+                <a:solidFill>
+                  <a:srgbClr val="0070C0"/>
+                </a:solidFill>
+                <a:latin typeface="Avenir Book" charset="0"/>
+                <a:ea typeface="Avenir Book" charset="0"/>
+                <a:cs typeface="Avenir Book" charset="0"/>
+              </a:rPr>
+              <a:t>Age:</a:t>
+            </a:r>
+            <a:endParaRPr lang="en-US" sz="2200" b="1" dirty="0" smtClean="0">
+              <a:solidFill>
+                <a:srgbClr val="0070C0"/>
+              </a:solidFill>
+              <a:latin typeface="Avenir Book" charset="0"/>
+              <a:ea typeface="Avenir Book" charset="0"/>
+              <a:cs typeface="Avenir Book" charset="0"/>
+            </a:endParaRPr>
+          </a:p>
+          <a:p>
+            <a:pPr algn="r">
+              <a:spcAft>
+                <a:spcPts val="660"/>
+              </a:spcAft>
+            </a:pPr>
+            <a:r>
+              <a:rPr lang="en-US" sz="2200" b="1" dirty="0" smtClean="0">
+                <a:solidFill>
+                  <a:srgbClr val="0070C0"/>
+                </a:solidFill>
+                <a:latin typeface="Avenir Book" charset="0"/>
+                <a:ea typeface="Avenir Book" charset="0"/>
+                <a:cs typeface="Avenir Book" charset="0"/>
+              </a:rPr>
+              <a:t>MRN:</a:t>
+            </a:r>
+          </a:p>
+          <a:p>
+            <a:pPr algn="r">
+              <a:spcAft>
+                <a:spcPts val="660"/>
+              </a:spcAft>
+            </a:pPr>
+            <a:r>
+              <a:rPr lang="en-US" sz="2200" b="1" dirty="0" smtClean="0">
+                <a:solidFill>
+                  <a:srgbClr val="0070C0"/>
+                </a:solidFill>
+                <a:latin typeface="Avenir Book" charset="0"/>
+                <a:ea typeface="Avenir Book" charset="0"/>
+                <a:cs typeface="Avenir Book" charset="0"/>
+              </a:rPr>
+              <a:t>Sex:</a:t>
+            </a:r>
+          </a:p>
+          <a:p>
+            <a:pPr algn="r">
+              <a:spcAft>
+                <a:spcPts val="660"/>
+              </a:spcAft>
+            </a:pPr>
+            <a:r>
+              <a:rPr lang="en-US" sz="2200" b="1" dirty="0" smtClean="0">
+                <a:solidFill>
+                  <a:srgbClr val="0070C0"/>
+                </a:solidFill>
+                <a:latin typeface="Avenir Book" charset="0"/>
+                <a:ea typeface="Avenir Book" charset="0"/>
+                <a:cs typeface="Avenir Book" charset="0"/>
+              </a:rPr>
+              <a:t>Scan:</a:t>
+            </a:r>
+          </a:p>
+          <a:p>
+            <a:pPr algn="r">
+              <a:spcAft>
+                <a:spcPts val="660"/>
+              </a:spcAft>
+            </a:pPr>
+            <a:r>
+              <a:rPr lang="en-US" sz="2200" b="1" dirty="0" smtClean="0">
+                <a:solidFill>
+                  <a:srgbClr val="0070C0"/>
+                </a:solidFill>
+                <a:latin typeface="Avenir Book" charset="0"/>
+                <a:ea typeface="Avenir Book" charset="0"/>
+                <a:cs typeface="Avenir Book" charset="0"/>
+              </a:rPr>
+              <a:t>Condition</a:t>
+            </a:r>
+            <a:r>
               <a:rPr lang="en-US" sz="2200" b="1" dirty="0">
                 <a:solidFill>
                   <a:srgbClr val="0070C0"/>
@@ -3855,20 +3905,7 @@
                 <a:ea typeface="Avenir Book" charset="0"/>
                 <a:cs typeface="Avenir Book" charset="0"/>
               </a:rPr>
-              <a:t>MRN:  </a:t>
-            </a:r>
-            <a:r>
-              <a:rPr lang="en-US" sz="2200" b="1" dirty="0" smtClean="0">
-                <a:solidFill>
-                  <a:schemeClr val="bg1">
-                    <a:lumMod val="50000"/>
-                  </a:schemeClr>
-                </a:solidFill>
-                <a:latin typeface="Avenir Book" charset="0"/>
-                <a:ea typeface="Avenir Book" charset="0"/>
-                <a:cs typeface="Avenir Book" charset="0"/>
-              </a:rPr>
-              <a:t>##########</a:t>
+              <a:t>:</a:t>
             </a:r>
             <a:endParaRPr lang="en-US" sz="2200" b="1" dirty="0">
               <a:solidFill>
@@ -3881,27 +3918,43 @@
               <a:cs typeface="Avenir Book" charset="0"/>
             </a:endParaRPr>
           </a:p>
-          <a:p>
-            <a:pPr algn="ctr">
+        </p:txBody>
+      </p:sp>
+      <p:sp>
+        <p:nvSpPr>
+          <p:cNvPr id="11" name="TextBox 10"/>
+          <p:cNvSpPr txBox="1"/>
+          <p:nvPr/>
+        </p:nvSpPr>
+        <p:spPr>
+          <a:xfrm>
+            <a:off x="4305918" y="2155517"/>
+            <a:ext cx="3223469" cy="431978"/>
+          </a:xfrm>
+          <a:prstGeom prst="rect">
+            <a:avLst/>
+          </a:prstGeom>
+          <a:solidFill>
+            <a:schemeClr val="bg1">
+              <a:lumMod val="95000"/>
+            </a:schemeClr>
+          </a:solidFill>
+        </p:spPr>
+        <p:txBody>
+          <a:bodyPr wrap="square" rtlCol="0">
+            <a:spAutoFit/>
+          </a:bodyPr>
+          <a:lstStyle/>
+          <a:p>
+            <a:pPr>
               <a:spcAft>
                 <a:spcPts val="660"/>
               </a:spcAft>
             </a:pPr>
             <a:r>
-              <a:rPr lang="en-US" sz="2200" b="1" dirty="0" smtClean="0">
-                <a:solidFill>
-                  <a:srgbClr val="0070C0"/>
-                </a:solidFill>
-                <a:latin typeface="Avenir Book" charset="0"/>
-                <a:ea typeface="Avenir Book" charset="0"/>
-                <a:cs typeface="Avenir Book" charset="0"/>
-              </a:rPr>
-              <a:t>Sex: </a:t>
-            </a:r>
-            <a:r>
-              <a:rPr lang="en-US" sz="2200" b="1" dirty="0" smtClean="0">
-                <a:solidFill>
-                  <a:schemeClr val="bg1">
+              <a:rPr lang="en-US" sz="2207" b="1" dirty="0" err="1" smtClean="0">
+                <a:solidFill>
+                  <a:schemeClr val="bg2">
                     <a:lumMod val="50000"/>
                   </a:schemeClr>
                 </a:solidFill>
@@ -3909,11 +3962,11 @@
                 <a:ea typeface="Avenir Book" charset="0"/>
                 <a:cs typeface="Avenir Book" charset="0"/>
               </a:rPr>
-              <a:t>Male/Female</a:t>
-            </a:r>
-            <a:endParaRPr lang="en-US" sz="2200" b="1" dirty="0">
+              <a:t>scan_dateYYYYmmdd</a:t>
+            </a:r>
+            <a:endParaRPr lang="en-US" sz="2207" b="1" dirty="0">
               <a:solidFill>
-                <a:schemeClr val="bg1">
+                <a:schemeClr val="bg2">
                   <a:lumMod val="50000"/>
                 </a:schemeClr>
               </a:solidFill>
@@ -3922,27 +3975,43 @@
               <a:cs typeface="Avenir Book" charset="0"/>
             </a:endParaRPr>
           </a:p>
-          <a:p>
-            <a:pPr algn="ctr">
+        </p:txBody>
+      </p:sp>
+      <p:sp>
+        <p:nvSpPr>
+          <p:cNvPr id="12" name="TextBox 11"/>
+          <p:cNvSpPr txBox="1"/>
+          <p:nvPr/>
+        </p:nvSpPr>
+        <p:spPr>
+          <a:xfrm>
+            <a:off x="4305918" y="4721737"/>
+            <a:ext cx="3223469" cy="431978"/>
+          </a:xfrm>
+          <a:prstGeom prst="rect">
+            <a:avLst/>
+          </a:prstGeom>
+          <a:solidFill>
+            <a:schemeClr val="bg1">
+              <a:lumMod val="95000"/>
+            </a:schemeClr>
+          </a:solidFill>
+        </p:spPr>
+        <p:txBody>
+          <a:bodyPr wrap="square" rtlCol="0">
+            <a:spAutoFit/>
+          </a:bodyPr>
+          <a:lstStyle/>
+          <a:p>
+            <a:pPr>
               <a:spcAft>
                 <a:spcPts val="660"/>
               </a:spcAft>
             </a:pPr>
             <a:r>
-              <a:rPr lang="en-US" sz="2200" b="1" dirty="0">
-                <a:solidFill>
-                  <a:srgbClr val="0070C0"/>
-                </a:solidFill>
-                <a:latin typeface="Avenir Book" charset="0"/>
-                <a:ea typeface="Avenir Book" charset="0"/>
-                <a:cs typeface="Avenir Book" charset="0"/>
-              </a:rPr>
-              <a:t>Scan: </a:t>
-            </a:r>
-            <a:r>
-              <a:rPr lang="en-US" sz="2200" b="1" dirty="0" smtClean="0">
-                <a:solidFill>
-                  <a:schemeClr val="bg1">
+              <a:rPr lang="en-US" sz="2207" b="1" dirty="0" err="1" smtClean="0">
+                <a:solidFill>
+                  <a:schemeClr val="bg2">
                     <a:lumMod val="50000"/>
                   </a:schemeClr>
                 </a:solidFill>
@@ -3950,30 +4019,82 @@
                 <a:ea typeface="Avenir Book" charset="0"/>
                 <a:cs typeface="Avenir Book" charset="0"/>
               </a:rPr>
-              <a:t>Clinical/Research</a:t>
-            </a:r>
-          </a:p>
-          <a:p>
-            <a:pPr algn="ctr">
+              <a:t>Athero</a:t>
+            </a:r>
+            <a:r>
+              <a:rPr lang="en-US" sz="2207" b="1" dirty="0" smtClean="0">
+                <a:solidFill>
+                  <a:schemeClr val="bg2">
+                    <a:lumMod val="50000"/>
+                  </a:schemeClr>
+                </a:solidFill>
+                <a:latin typeface="Avenir Book" charset="0"/>
+                <a:ea typeface="Avenir Book" charset="0"/>
+                <a:cs typeface="Avenir Book" charset="0"/>
+              </a:rPr>
+              <a:t>/</a:t>
+            </a:r>
+            <a:r>
+              <a:rPr lang="en-US" sz="2207" b="1" dirty="0" err="1" smtClean="0">
+                <a:solidFill>
+                  <a:schemeClr val="bg2">
+                    <a:lumMod val="50000"/>
+                  </a:schemeClr>
+                </a:solidFill>
+                <a:latin typeface="Avenir Book" charset="0"/>
+                <a:ea typeface="Avenir Book" charset="0"/>
+                <a:cs typeface="Avenir Book" charset="0"/>
+              </a:rPr>
+              <a:t>Moyamoya</a:t>
+            </a:r>
+            <a:endParaRPr lang="en-US" sz="2207" b="1" dirty="0">
+              <a:solidFill>
+                <a:schemeClr val="bg2">
+                  <a:lumMod val="50000"/>
+                </a:schemeClr>
+              </a:solidFill>
+              <a:latin typeface="Avenir Book" charset="0"/>
+              <a:ea typeface="Avenir Book" charset="0"/>
+              <a:cs typeface="Avenir Book" charset="0"/>
+            </a:endParaRPr>
+          </a:p>
+        </p:txBody>
+      </p:sp>
+      <p:sp>
+        <p:nvSpPr>
+          <p:cNvPr id="17" name="TextBox 16"/>
+          <p:cNvSpPr txBox="1"/>
+          <p:nvPr/>
+        </p:nvSpPr>
+        <p:spPr>
+          <a:xfrm>
+            <a:off x="4305918" y="4289759"/>
+            <a:ext cx="3223469" cy="431978"/>
+          </a:xfrm>
+          <a:prstGeom prst="rect">
+            <a:avLst/>
+          </a:prstGeom>
+          <a:solidFill>
+            <a:schemeClr val="bg1">
+              <a:lumMod val="95000"/>
+            </a:schemeClr>
+          </a:solidFill>
+        </p:spPr>
+        <p:txBody>
+          <a:bodyPr wrap="square" rtlCol="0">
+            <a:spAutoFit/>
+          </a:bodyPr>
+          <a:lstStyle/>
+          <a:p>
+            <a:pPr>
               <a:spcAft>
                 <a:spcPts val="660"/>
               </a:spcAft>
             </a:pPr>
             <a:r>
-              <a:rPr lang="en-US" sz="2200" b="1" dirty="0" smtClean="0">
-                <a:solidFill>
-                  <a:srgbClr val="0070C0"/>
-                </a:solidFill>
-                <a:latin typeface="Avenir Book" charset="0"/>
-                <a:ea typeface="Avenir Book" charset="0"/>
-                <a:cs typeface="Avenir Book" charset="0"/>
-              </a:rPr>
-              <a:t>Condition: </a:t>
-            </a:r>
-            <a:r>
-              <a:rPr lang="en-US" sz="2200" b="1" dirty="0" err="1" smtClean="0">
-                <a:solidFill>
-                  <a:schemeClr val="bg1">
+              <a:rPr lang="en-US" sz="2207" b="1" dirty="0" smtClean="0">
+                <a:solidFill>
+                  <a:schemeClr val="bg2">
                     <a:lumMod val="50000"/>
                   </a:schemeClr>
                 </a:solidFill>
@@ -3981,12 +4102,56 @@
                 <a:ea typeface="Avenir Book" charset="0"/>
                 <a:cs typeface="Avenir Book" charset="0"/>
               </a:rPr>
-              <a:t>Athero</a:t>
-            </a:r>
-            <a:r>
-              <a:rPr lang="en-US" sz="2200" b="1" dirty="0" smtClean="0">
-                <a:solidFill>
-                  <a:schemeClr val="bg1">
+              <a:t>Clinical/Research</a:t>
+            </a:r>
+            <a:endParaRPr lang="en-US" sz="2207" b="1" dirty="0">
+              <a:solidFill>
+                <a:schemeClr val="bg2">
+                  <a:lumMod val="50000"/>
+                </a:schemeClr>
+              </a:solidFill>
+              <a:latin typeface="Avenir Book" charset="0"/>
+              <a:ea typeface="Avenir Book" charset="0"/>
+              <a:cs typeface="Avenir Book" charset="0"/>
+            </a:endParaRPr>
+          </a:p>
+        </p:txBody>
+      </p:sp>
+      <p:sp>
+        <p:nvSpPr>
+          <p:cNvPr id="18" name="TextBox 17"/>
+          <p:cNvSpPr txBox="1"/>
+          <p:nvPr/>
+        </p:nvSpPr>
+        <p:spPr>
+          <a:xfrm>
+            <a:off x="4305918" y="3857781"/>
+            <a:ext cx="3223469" cy="431978"/>
+          </a:xfrm>
+          <a:prstGeom prst="rect">
+            <a:avLst/>
+          </a:prstGeom>
+          <a:solidFill>
+            <a:schemeClr val="bg1">
+              <a:lumMod val="95000"/>
+            </a:schemeClr>
+          </a:solidFill>
+        </p:spPr>
+        <p:txBody>
+          <a:bodyPr wrap="square" rtlCol="0">
+            <a:spAutoFit/>
+          </a:bodyPr>
+          <a:lstStyle/>
+          <a:p>
+            <a:pPr>
+              <a:spcAft>
+                <a:spcPts val="660"/>
+              </a:spcAft>
+            </a:pPr>
+            <a:r>
+              <a:rPr lang="en-US" sz="2207" b="1" dirty="0" smtClean="0">
+                <a:solidFill>
+                  <a:schemeClr val="bg2">
                     <a:lumMod val="50000"/>
                   </a:schemeClr>
                 </a:solidFill>
@@ -3994,12 +4159,56 @@
                 <a:ea typeface="Avenir Book" charset="0"/>
                 <a:cs typeface="Avenir Book" charset="0"/>
               </a:rPr>
-              <a:t>/</a:t>
-            </a:r>
-            <a:r>
-              <a:rPr lang="en-US" sz="2200" b="1" dirty="0" err="1" smtClean="0">
-                <a:solidFill>
-                  <a:schemeClr val="bg1">
+              <a:t>Male/Female</a:t>
+            </a:r>
+            <a:endParaRPr lang="en-US" sz="2207" b="1" dirty="0">
+              <a:solidFill>
+                <a:schemeClr val="bg2">
+                  <a:lumMod val="50000"/>
+                </a:schemeClr>
+              </a:solidFill>
+              <a:latin typeface="Avenir Book" charset="0"/>
+              <a:ea typeface="Avenir Book" charset="0"/>
+              <a:cs typeface="Avenir Book" charset="0"/>
+            </a:endParaRPr>
+          </a:p>
+        </p:txBody>
+      </p:sp>
+      <p:sp>
+        <p:nvSpPr>
+          <p:cNvPr id="19" name="TextBox 18"/>
+          <p:cNvSpPr txBox="1"/>
+          <p:nvPr/>
+        </p:nvSpPr>
+        <p:spPr>
+          <a:xfrm>
+            <a:off x="4305918" y="3425803"/>
+            <a:ext cx="3223469" cy="431978"/>
+          </a:xfrm>
+          <a:prstGeom prst="rect">
+            <a:avLst/>
+          </a:prstGeom>
+          <a:solidFill>
+            <a:schemeClr val="bg1">
+              <a:lumMod val="95000"/>
+            </a:schemeClr>
+          </a:solidFill>
+        </p:spPr>
+        <p:txBody>
+          <a:bodyPr wrap="square" rtlCol="0">
+            <a:spAutoFit/>
+          </a:bodyPr>
+          <a:lstStyle/>
+          <a:p>
+            <a:pPr>
+              <a:spcAft>
+                <a:spcPts val="660"/>
+              </a:spcAft>
+            </a:pPr>
+            <a:r>
+              <a:rPr lang="en-US" sz="2207" b="1" dirty="0" err="1" smtClean="0">
+                <a:solidFill>
+                  <a:schemeClr val="bg2">
                     <a:lumMod val="50000"/>
                   </a:schemeClr>
                 </a:solidFill>
@@ -4007,11 +4216,164 @@
                 <a:ea typeface="Avenir Book" charset="0"/>
                 <a:cs typeface="Avenir Book" charset="0"/>
               </a:rPr>
-              <a:t>Moyamoya</a:t>
-            </a:r>
-            <a:endParaRPr lang="en-US" sz="2200" b="1" dirty="0">
+              <a:t>mrn</a:t>
+            </a:r>
+            <a:r>
+              <a:rPr lang="en-US" sz="2207" b="1" dirty="0" smtClean="0">
+                <a:solidFill>
+                  <a:schemeClr val="bg2">
+                    <a:lumMod val="50000"/>
+                  </a:schemeClr>
+                </a:solidFill>
+                <a:latin typeface="Avenir Book" charset="0"/>
+                <a:ea typeface="Avenir Book" charset="0"/>
+                <a:cs typeface="Avenir Book" charset="0"/>
+              </a:rPr>
+              <a:t>##########</a:t>
+            </a:r>
+            <a:endParaRPr lang="en-US" sz="2207" b="1" dirty="0">
               <a:solidFill>
-                <a:schemeClr val="bg1">
+                <a:schemeClr val="bg2">
+                  <a:lumMod val="50000"/>
+                </a:schemeClr>
+              </a:solidFill>
+              <a:latin typeface="Avenir Book" charset="0"/>
+              <a:ea typeface="Avenir Book" charset="0"/>
+              <a:cs typeface="Avenir Book" charset="0"/>
+            </a:endParaRPr>
+          </a:p>
+        </p:txBody>
+      </p:sp>
+      <p:sp>
+        <p:nvSpPr>
+          <p:cNvPr id="20" name="TextBox 19"/>
+          <p:cNvSpPr txBox="1"/>
+          <p:nvPr/>
+        </p:nvSpPr>
+        <p:spPr>
+          <a:xfrm>
+            <a:off x="4305918" y="2568126"/>
+            <a:ext cx="3223469" cy="431978"/>
+          </a:xfrm>
+          <a:prstGeom prst="rect">
+            <a:avLst/>
+          </a:prstGeom>
+          <a:solidFill>
+            <a:schemeClr val="bg1">
+              <a:lumMod val="95000"/>
+            </a:schemeClr>
+          </a:solidFill>
+        </p:spPr>
+        <p:txBody>
+          <a:bodyPr wrap="square" rtlCol="0">
+            <a:spAutoFit/>
+          </a:bodyPr>
+          <a:lstStyle/>
+          <a:p>
+            <a:pPr>
+              <a:spcAft>
+                <a:spcPts val="660"/>
+              </a:spcAft>
+            </a:pPr>
+            <a:r>
+              <a:rPr lang="en-US" sz="2207" b="1" dirty="0" err="1" smtClean="0">
+                <a:solidFill>
+                  <a:schemeClr val="bg2">
+                    <a:lumMod val="50000"/>
+                  </a:schemeClr>
+                </a:solidFill>
+                <a:latin typeface="Avenir Book" charset="0"/>
+                <a:ea typeface="Avenir Book" charset="0"/>
+                <a:cs typeface="Avenir Book" charset="0"/>
+              </a:rPr>
+              <a:t>dobYYYYmmdd</a:t>
+            </a:r>
+            <a:endParaRPr lang="en-US" sz="2207" b="1" dirty="0">
+              <a:solidFill>
+                <a:schemeClr val="bg2">
+                  <a:lumMod val="50000"/>
+                </a:schemeClr>
+              </a:solidFill>
+              <a:latin typeface="Avenir Book" charset="0"/>
+              <a:ea typeface="Avenir Book" charset="0"/>
+              <a:cs typeface="Avenir Book" charset="0"/>
+            </a:endParaRPr>
+          </a:p>
+        </p:txBody>
+      </p:sp>
+      <p:sp>
+        <p:nvSpPr>
+          <p:cNvPr id="21" name="TextBox 20"/>
+          <p:cNvSpPr txBox="1"/>
+          <p:nvPr/>
+        </p:nvSpPr>
+        <p:spPr>
+          <a:xfrm>
+            <a:off x="4305918" y="2998904"/>
+            <a:ext cx="3223469" cy="431978"/>
+          </a:xfrm>
+          <a:prstGeom prst="rect">
+            <a:avLst/>
+          </a:prstGeom>
+          <a:solidFill>
+            <a:schemeClr val="bg1">
+              <a:lumMod val="95000"/>
+            </a:schemeClr>
+          </a:solidFill>
+        </p:spPr>
+        <p:txBody>
+          <a:bodyPr wrap="square" rtlCol="0">
+            <a:spAutoFit/>
+          </a:bodyPr>
+          <a:lstStyle/>
+          <a:p>
+            <a:pPr>
+              <a:spcAft>
+                <a:spcPts val="660"/>
+              </a:spcAft>
+            </a:pPr>
+            <a:r>
+              <a:rPr lang="en-US" sz="2207" b="1" dirty="0" smtClean="0">
+                <a:solidFill>
+                  <a:schemeClr val="bg2">
+                    <a:lumMod val="50000"/>
+                  </a:schemeClr>
+                </a:solidFill>
+                <a:latin typeface="Avenir Book" charset="0"/>
+                <a:ea typeface="Avenir Book" charset="0"/>
+                <a:cs typeface="Avenir Book" charset="0"/>
+              </a:rPr>
+              <a:t>age## </a:t>
+            </a:r>
+            <a:r>
+              <a:rPr lang="en-US" sz="2207" b="1" dirty="0" err="1" smtClean="0">
+                <a:solidFill>
+                  <a:schemeClr val="bg2">
+                    <a:lumMod val="50000"/>
+                  </a:schemeClr>
+                </a:solidFill>
+                <a:latin typeface="Avenir Book" charset="0"/>
+                <a:ea typeface="Avenir Book" charset="0"/>
+                <a:cs typeface="Avenir Book" charset="0"/>
+              </a:rPr>
+              <a:t>y.o</a:t>
+            </a:r>
+            <a:r>
+              <a:rPr lang="en-US" sz="2207" b="1" dirty="0" smtClean="0">
+                <a:solidFill>
+                  <a:schemeClr val="bg2">
+                    <a:lumMod val="50000"/>
+                  </a:schemeClr>
+                </a:solidFill>
+                <a:latin typeface="Avenir Book" charset="0"/>
+                <a:ea typeface="Avenir Book" charset="0"/>
+                <a:cs typeface="Avenir Book" charset="0"/>
+              </a:rPr>
+              <a:t>.</a:t>
+            </a:r>
+            <a:endParaRPr lang="en-US" sz="2207" b="1" dirty="0">
+              <a:solidFill>
+                <a:schemeClr val="bg2">
                   <a:lumMod val="50000"/>
                 </a:schemeClr>
               </a:solidFill>
@@ -4788,49 +5150,15 @@
               </a:spcAft>
             </a:pPr>
             <a:r>
-              <a:rPr lang="en-US" sz="2207" b="1" dirty="0">
-                <a:solidFill>
-                  <a:srgbClr val="0070C0"/>
-                </a:solidFill>
-                <a:latin typeface="Avenir Book" charset="0"/>
-                <a:ea typeface="Avenir Book" charset="0"/>
-                <a:cs typeface="Avenir Book" charset="0"/>
-              </a:rPr>
-              <a:t>History:</a:t>
-            </a:r>
-            <a:r>
-              <a:rPr lang="en-US" sz="2207" dirty="0">
-                <a:solidFill>
-                  <a:srgbClr val="0070C0"/>
-                </a:solidFill>
-                <a:latin typeface="Avenir Book" charset="0"/>
-                <a:ea typeface="Avenir Book" charset="0"/>
-                <a:cs typeface="Avenir Book" charset="0"/>
-              </a:rPr>
-              <a:t> </a:t>
-            </a:r>
-            <a:r>
-              <a:rPr lang="en-US" sz="2207" dirty="0" smtClean="0">
-                <a:solidFill>
-                  <a:schemeClr val="tx1">
-                    <a:lumMod val="75000"/>
-                    <a:lumOff val="25000"/>
-                  </a:schemeClr>
-                </a:solidFill>
-                <a:latin typeface="Avenir Book" charset="0"/>
-                <a:ea typeface="Avenir Book" charset="0"/>
-                <a:cs typeface="Avenir Book" charset="0"/>
-              </a:rPr>
-              <a:t>## </a:t>
-            </a:r>
-            <a:r>
-              <a:rPr lang="en-US" sz="2207" dirty="0" err="1">
-                <a:solidFill>
-                  <a:schemeClr val="tx1">
-                    <a:lumMod val="75000"/>
-                    <a:lumOff val="25000"/>
-                  </a:schemeClr>
-                </a:solidFill>
+              <a:rPr lang="en-US" sz="2207" b="1" dirty="0" smtClean="0">
+                <a:latin typeface="Avenir Book" charset="0"/>
+                <a:ea typeface="Avenir Book" charset="0"/>
+                <a:cs typeface="Avenir Book" charset="0"/>
+              </a:rPr>
+              <a:t>History: age## </a:t>
+            </a:r>
+            <a:r>
+              <a:rPr lang="en-US" sz="2207" b="1" dirty="0" err="1" smtClean="0">
                 <a:latin typeface="Avenir Book" charset="0"/>
                 <a:ea typeface="Avenir Book" charset="0"/>
                 <a:cs typeface="Avenir Book" charset="0"/>
@@ -4838,82 +5166,38 @@
               <a:t>y.o</a:t>
             </a:r>
             <a:r>
-              <a:rPr lang="en-US" sz="2207" dirty="0">
-                <a:solidFill>
-                  <a:schemeClr val="tx1">
-                    <a:lumMod val="75000"/>
-                    <a:lumOff val="25000"/>
-                  </a:schemeClr>
-                </a:solidFill>
-                <a:latin typeface="Avenir Book" charset="0"/>
-                <a:ea typeface="Avenir Book" charset="0"/>
-                <a:cs typeface="Avenir Book" charset="0"/>
-              </a:rPr>
-              <a:t>. </a:t>
-            </a:r>
-            <a:r>
-              <a:rPr lang="en-US" sz="2207" dirty="0" err="1" smtClean="0">
-                <a:solidFill>
-                  <a:schemeClr val="tx1">
-                    <a:lumMod val="75000"/>
-                    <a:lumOff val="25000"/>
-                  </a:schemeClr>
-                </a:solidFill>
-                <a:latin typeface="Avenir Book" charset="0"/>
-                <a:ea typeface="Avenir Book" charset="0"/>
-                <a:cs typeface="Avenir Book" charset="0"/>
-              </a:rPr>
-              <a:t>XXmale</a:t>
-            </a:r>
-            <a:r>
-              <a:rPr lang="en-US" sz="2207" dirty="0" smtClean="0">
-                <a:solidFill>
-                  <a:schemeClr val="tx1">
-                    <a:lumMod val="75000"/>
-                    <a:lumOff val="25000"/>
-                  </a:schemeClr>
-                </a:solidFill>
-                <a:latin typeface="Avenir Book" charset="0"/>
-                <a:ea typeface="Avenir Book" charset="0"/>
-                <a:cs typeface="Avenir Book" charset="0"/>
-              </a:rPr>
-              <a:t> </a:t>
-            </a:r>
-            <a:r>
-              <a:rPr lang="en-US" sz="2207" dirty="0">
-                <a:solidFill>
-                  <a:schemeClr val="tx1">
-                    <a:lumMod val="75000"/>
-                    <a:lumOff val="25000"/>
-                  </a:schemeClr>
-                </a:solidFill>
-                <a:latin typeface="Avenir Book" charset="0"/>
-                <a:ea typeface="Avenir Book" charset="0"/>
-                <a:cs typeface="Avenir Book" charset="0"/>
-              </a:rPr>
-              <a:t>with </a:t>
-            </a:r>
-            <a:r>
-              <a:rPr lang="is-IS" sz="2207" dirty="0" smtClean="0">
-                <a:solidFill>
-                  <a:schemeClr val="tx1">
-                    <a:lumMod val="75000"/>
-                    <a:lumOff val="25000"/>
-                  </a:schemeClr>
-                </a:solidFill>
+              <a:rPr lang="en-US" sz="2207" b="1" dirty="0" smtClean="0">
+                <a:latin typeface="Avenir Book" charset="0"/>
+                <a:ea typeface="Avenir Book" charset="0"/>
+                <a:cs typeface="Avenir Book" charset="0"/>
+              </a:rPr>
+              <a:t>. male/female with </a:t>
+            </a:r>
+            <a:r>
+              <a:rPr lang="en-US" sz="2207" b="1" dirty="0" err="1" smtClean="0">
+                <a:latin typeface="Avenir Book" charset="0"/>
+                <a:ea typeface="Avenir Book" charset="0"/>
+                <a:cs typeface="Avenir Book" charset="0"/>
+              </a:rPr>
+              <a:t>athero</a:t>
+            </a:r>
+            <a:r>
+              <a:rPr lang="en-US" sz="2207" b="1" dirty="0" smtClean="0">
+                <a:latin typeface="Avenir Book" charset="0"/>
+                <a:ea typeface="Avenir Book" charset="0"/>
+                <a:cs typeface="Avenir Book" charset="0"/>
+              </a:rPr>
+              <a:t>/</a:t>
+            </a:r>
+            <a:r>
+              <a:rPr lang="en-US" sz="2207" b="1" dirty="0" err="1" smtClean="0">
                 <a:latin typeface="Avenir Book" charset="0"/>
                 <a:ea typeface="Avenir Book" charset="0"/>
                 <a:cs typeface="Avenir Book" charset="0"/>
               </a:rPr>
               <a:t>Moyamoya</a:t>
             </a:r>
-            <a:endParaRPr lang="en-US" sz="2207" dirty="0">
-              <a:solidFill>
-                <a:schemeClr val="tx1">
-                  <a:lumMod val="75000"/>
-                  <a:lumOff val="25000"/>
-                </a:schemeClr>
-              </a:solidFill>
+            <a:endParaRPr lang="en-US" sz="2207" b="1" dirty="0">
               <a:latin typeface="Avenir Book" charset="0"/>
               <a:ea typeface="Avenir Book" charset="0"/>
               <a:cs typeface="Avenir Book" charset="0"/>
@@ -4932,7 +5216,7 @@
         <p:spPr bwMode="auto">
           <a:xfrm>
             <a:off x="5278265" y="2354438"/>
-            <a:ext cx="4444855" cy="344197"/>
+            <a:ext cx="4444855" cy="348942"/>
           </a:xfrm>
           <a:prstGeom prst="rect">
             <a:avLst/>
@@ -4963,7 +5247,7 @@
               <a:buNone/>
             </a:pPr>
             <a:r>
-              <a:rPr lang="en-US" altLang="en-US" sz="1760" b="1" dirty="0">
+              <a:rPr lang="en-US" altLang="en-US" sz="1760" b="1" smtClean="0">
                 <a:solidFill>
                   <a:srgbClr val="0070C0"/>
                 </a:solidFill>
@@ -4973,6 +5257,14 @@
               </a:rPr>
               <a:t>IMAGING</a:t>
             </a:r>
+            <a:endParaRPr lang="en-US" altLang="en-US" sz="1760" b="1" dirty="0">
+              <a:solidFill>
+                <a:srgbClr val="0070C0"/>
+              </a:solidFill>
+              <a:latin typeface="Avenir Book" charset="0"/>
+              <a:ea typeface="Avenir Book" charset="0"/>
+              <a:cs typeface="Avenir Book" charset="0"/>
+            </a:endParaRPr>
           </a:p>
         </p:txBody>
       </p:sp>

</xml_diff>

<commit_message>
updates to better handle dicom/nifti input
</commit_message>
<xml_diff>
--- a/bin/TEMPLATE_BOLD_PLACEHOLDERS.pptx
+++ b/bin/TEMPLATE_BOLD_PLACEHOLDERS.pptx
@@ -218,7 +218,7 @@
           <a:p>
             <a:fld id="{2E9DB196-4E5B-B64B-848D-69F7B54B86BB}" type="datetimeFigureOut">
               <a:rPr lang="en-US" smtClean="0"/>
-              <a:t>8/5/20</a:t>
+              <a:t>11/11/20</a:t>
             </a:fld>
             <a:endParaRPr lang="en-US"/>
           </a:p>
@@ -825,7 +825,7 @@
           <a:p>
             <a:fld id="{AFCB438B-53EA-094D-A45F-391681BE2E8A}" type="datetimeFigureOut">
               <a:rPr lang="en-US" smtClean="0"/>
-              <a:t>8/5/20</a:t>
+              <a:t>11/11/20</a:t>
             </a:fld>
             <a:endParaRPr lang="en-US"/>
           </a:p>
@@ -990,7 +990,7 @@
           <a:p>
             <a:fld id="{AFCB438B-53EA-094D-A45F-391681BE2E8A}" type="datetimeFigureOut">
               <a:rPr lang="en-US" smtClean="0"/>
-              <a:t>8/5/20</a:t>
+              <a:t>11/11/20</a:t>
             </a:fld>
             <a:endParaRPr lang="en-US"/>
           </a:p>
@@ -1165,7 +1165,7 @@
           <a:p>
             <a:fld id="{AFCB438B-53EA-094D-A45F-391681BE2E8A}" type="datetimeFigureOut">
               <a:rPr lang="en-US" smtClean="0"/>
-              <a:t>8/5/20</a:t>
+              <a:t>11/11/20</a:t>
             </a:fld>
             <a:endParaRPr lang="en-US"/>
           </a:p>
@@ -1384,7 +1384,7 @@
           <a:p>
             <a:fld id="{AFCB438B-53EA-094D-A45F-391681BE2E8A}" type="datetimeFigureOut">
               <a:rPr lang="en-US" smtClean="0"/>
-              <a:t>8/5/20</a:t>
+              <a:t>11/11/20</a:t>
             </a:fld>
             <a:endParaRPr lang="en-US"/>
           </a:p>
@@ -1623,7 +1623,7 @@
           <a:p>
             <a:fld id="{AFCB438B-53EA-094D-A45F-391681BE2E8A}" type="datetimeFigureOut">
               <a:rPr lang="en-US" smtClean="0"/>
-              <a:t>8/5/20</a:t>
+              <a:t>11/11/20</a:t>
             </a:fld>
             <a:endParaRPr lang="en-US"/>
           </a:p>
@@ -1850,7 +1850,7 @@
           <a:p>
             <a:fld id="{AFCB438B-53EA-094D-A45F-391681BE2E8A}" type="datetimeFigureOut">
               <a:rPr lang="en-US" smtClean="0"/>
-              <a:t>8/5/20</a:t>
+              <a:t>11/11/20</a:t>
             </a:fld>
             <a:endParaRPr lang="en-US"/>
           </a:p>
@@ -2212,7 +2212,7 @@
           <a:p>
             <a:fld id="{AFCB438B-53EA-094D-A45F-391681BE2E8A}" type="datetimeFigureOut">
               <a:rPr lang="en-US" smtClean="0"/>
-              <a:t>8/5/20</a:t>
+              <a:t>11/11/20</a:t>
             </a:fld>
             <a:endParaRPr lang="en-US"/>
           </a:p>
@@ -2325,7 +2325,7 @@
           <a:p>
             <a:fld id="{AFCB438B-53EA-094D-A45F-391681BE2E8A}" type="datetimeFigureOut">
               <a:rPr lang="en-US" smtClean="0"/>
-              <a:t>8/5/20</a:t>
+              <a:t>11/11/20</a:t>
             </a:fld>
             <a:endParaRPr lang="en-US"/>
           </a:p>
@@ -2415,7 +2415,7 @@
           <a:p>
             <a:fld id="{AFCB438B-53EA-094D-A45F-391681BE2E8A}" type="datetimeFigureOut">
               <a:rPr lang="en-US" smtClean="0"/>
-              <a:t>8/5/20</a:t>
+              <a:t>11/11/20</a:t>
             </a:fld>
             <a:endParaRPr lang="en-US"/>
           </a:p>
@@ -2687,7 +2687,7 @@
           <a:p>
             <a:fld id="{AFCB438B-53EA-094D-A45F-391681BE2E8A}" type="datetimeFigureOut">
               <a:rPr lang="en-US" smtClean="0"/>
-              <a:t>8/5/20</a:t>
+              <a:t>11/11/20</a:t>
             </a:fld>
             <a:endParaRPr lang="en-US"/>
           </a:p>
@@ -2939,7 +2939,7 @@
           <a:p>
             <a:fld id="{AFCB438B-53EA-094D-A45F-391681BE2E8A}" type="datetimeFigureOut">
               <a:rPr lang="en-US" smtClean="0"/>
-              <a:t>8/5/20</a:t>
+              <a:t>11/11/20</a:t>
             </a:fld>
             <a:endParaRPr lang="en-US"/>
           </a:p>
@@ -3147,7 +3147,7 @@
           <a:p>
             <a:fld id="{AFCB438B-53EA-094D-A45F-391681BE2E8A}" type="datetimeFigureOut">
               <a:rPr lang="en-US" smtClean="0"/>
-              <a:t>8/5/20</a:t>
+              <a:t>11/11/20</a:t>
             </a:fld>
             <a:endParaRPr lang="en-US"/>
           </a:p>
@@ -3785,18 +3785,7 @@
                 <a:ea typeface="Avenir Book" charset="0"/>
                 <a:cs typeface="Avenir Book" charset="0"/>
               </a:rPr>
-              <a:t>DOB</a:t>
-            </a:r>
-            <a:r>
-              <a:rPr lang="en-US" sz="2200" b="1" dirty="0" smtClean="0">
-                <a:solidFill>
-                  <a:srgbClr val="0070C0"/>
-                </a:solidFill>
-                <a:latin typeface="Avenir Book" charset="0"/>
-                <a:ea typeface="Avenir Book" charset="0"/>
-                <a:cs typeface="Avenir Book" charset="0"/>
-              </a:rPr>
-              <a:t>:</a:t>
+              <a:t>DOB:</a:t>
             </a:r>
           </a:p>
           <a:p>
@@ -3816,14 +3805,6 @@
               </a:rPr>
               <a:t>Age:</a:t>
             </a:r>
-            <a:endParaRPr lang="en-US" sz="2200" b="1" dirty="0" smtClean="0">
-              <a:solidFill>
-                <a:srgbClr val="0070C0"/>
-              </a:solidFill>
-              <a:latin typeface="Avenir Book" charset="0"/>
-              <a:ea typeface="Avenir Book" charset="0"/>
-              <a:cs typeface="Avenir Book" charset="0"/>
-            </a:endParaRPr>
           </a:p>
           <a:p>
             <a:pPr algn="r">
@@ -4829,7 +4810,7 @@
             <a:r>
               <a:rPr lang="en-US" sz="1600" dirty="0">
                 <a:solidFill>
-                  <a:srgbClr val="FFFFFF"/>
+                  <a:srgbClr val="FF0000"/>
                 </a:solidFill>
                 <a:latin typeface="Avenir Book" charset="0"/>
                 <a:ea typeface="Avenir Book" charset="0"/>
@@ -4840,7 +4821,7 @@
             <a:r>
               <a:rPr lang="en-US" sz="1600" dirty="0" smtClean="0">
                 <a:solidFill>
-                  <a:srgbClr val="FFFFFF"/>
+                  <a:srgbClr val="FF0000"/>
                 </a:solidFill>
                 <a:latin typeface="Avenir Book" charset="0"/>
                 <a:ea typeface="Avenir Book" charset="0"/>
@@ -4851,7 +4832,7 @@
             <a:r>
               <a:rPr lang="en-US" sz="1600" dirty="0">
                 <a:solidFill>
-                  <a:srgbClr val="FFFFFF"/>
+                  <a:srgbClr val="FF0000"/>
                 </a:solidFill>
                 <a:latin typeface="Avenir Book" charset="0"/>
                 <a:ea typeface="Avenir Book" charset="0"/>
@@ -4862,7 +4843,7 @@
             <a:r>
               <a:rPr lang="en-US" sz="1600" b="1" dirty="0">
                 <a:solidFill>
-                  <a:srgbClr val="FFFFFF"/>
+                  <a:srgbClr val="FF0000"/>
                 </a:solidFill>
                 <a:latin typeface="Avenir Book" charset="0"/>
                 <a:ea typeface="Avenir Book" charset="0"/>
@@ -8217,7 +8198,7 @@
             <a:r>
               <a:rPr lang="en-US" sz="1600" dirty="0">
                 <a:solidFill>
-                  <a:srgbClr val="FFFFFF"/>
+                  <a:srgbClr val="FF0000"/>
                 </a:solidFill>
                 <a:latin typeface="Avenir Book" charset="0"/>
                 <a:ea typeface="Avenir Book" charset="0"/>
@@ -8228,7 +8209,7 @@
             <a:r>
               <a:rPr lang="en-US" sz="1600" dirty="0" smtClean="0">
                 <a:solidFill>
-                  <a:srgbClr val="FFFFFF"/>
+                  <a:srgbClr val="FF0000"/>
                 </a:solidFill>
                 <a:latin typeface="Avenir Book" charset="0"/>
                 <a:ea typeface="Avenir Book" charset="0"/>
@@ -8238,7 +8219,7 @@
             </a:r>
             <a:endParaRPr lang="en-US" sz="1600" b="1" dirty="0">
               <a:solidFill>
-                <a:srgbClr val="FFFFFF"/>
+                <a:srgbClr val="FF0000"/>
               </a:solidFill>
               <a:latin typeface="Avenir Book" charset="0"/>
               <a:ea typeface="Avenir Book" charset="0"/>
@@ -8324,7 +8305,7 @@
           <p:cNvPr id="14" name="Oval 13">
             <a:extLst>
               <a:ext uri="{FF2B5EF4-FFF2-40B4-BE49-F238E27FC236}">
-                <a16:creationId xmlns:a16="http://schemas.microsoft.com/office/drawing/2014/main" xmlns="" id="{D79BB1CE-39DB-BB49-A501-C6EFD2590B3E}"/>
+                <a16:creationId xmlns="" xmlns:a16="http://schemas.microsoft.com/office/drawing/2014/main" id="{D79BB1CE-39DB-BB49-A501-C6EFD2590B3E}"/>
               </a:ext>
             </a:extLst>
           </p:cNvPr>
@@ -8378,7 +8359,7 @@
           <p:cNvPr id="15" name="TextBox 14">
             <a:extLst>
               <a:ext uri="{FF2B5EF4-FFF2-40B4-BE49-F238E27FC236}">
-                <a16:creationId xmlns:a16="http://schemas.microsoft.com/office/drawing/2014/main" xmlns="" id="{549D0D24-412B-7248-8FF0-F05F9C55085D}"/>
+                <a16:creationId xmlns="" xmlns:a16="http://schemas.microsoft.com/office/drawing/2014/main" id="{549D0D24-412B-7248-8FF0-F05F9C55085D}"/>
               </a:ext>
             </a:extLst>
           </p:cNvPr>
@@ -8415,7 +8396,7 @@
           <p:cNvPr id="17" name="Oval 16">
             <a:extLst>
               <a:ext uri="{FF2B5EF4-FFF2-40B4-BE49-F238E27FC236}">
-                <a16:creationId xmlns:a16="http://schemas.microsoft.com/office/drawing/2014/main" xmlns="" id="{AC3A3EC1-2396-B943-9A2D-48335F761392}"/>
+                <a16:creationId xmlns="" xmlns:a16="http://schemas.microsoft.com/office/drawing/2014/main" id="{AC3A3EC1-2396-B943-9A2D-48335F761392}"/>
               </a:ext>
             </a:extLst>
           </p:cNvPr>
@@ -8469,7 +8450,7 @@
           <p:cNvPr id="18" name="TextBox 17">
             <a:extLst>
               <a:ext uri="{FF2B5EF4-FFF2-40B4-BE49-F238E27FC236}">
-                <a16:creationId xmlns:a16="http://schemas.microsoft.com/office/drawing/2014/main" xmlns="" id="{9387BF14-286E-9147-8AFD-F2A31BFA281B}"/>
+                <a16:creationId xmlns="" xmlns:a16="http://schemas.microsoft.com/office/drawing/2014/main" id="{9387BF14-286E-9147-8AFD-F2A31BFA281B}"/>
               </a:ext>
             </a:extLst>
           </p:cNvPr>
@@ -8760,7 +8741,7 @@
             <a:r>
               <a:rPr lang="en-US" sz="1600" dirty="0" smtClean="0">
                 <a:solidFill>
-                  <a:srgbClr val="FFFFFF"/>
+                  <a:srgbClr val="FF0000"/>
                 </a:solidFill>
                 <a:latin typeface="Avenir Book" charset="0"/>
                 <a:ea typeface="Avenir Book" charset="0"/>
@@ -8770,7 +8751,7 @@
             </a:r>
             <a:endParaRPr lang="en-US" sz="1600" b="1" dirty="0">
               <a:solidFill>
-                <a:srgbClr val="FFFFFF"/>
+                <a:srgbClr val="FF0000"/>
               </a:solidFill>
               <a:latin typeface="Avenir Book" charset="0"/>
               <a:ea typeface="Avenir Book" charset="0"/>
@@ -9173,7 +9154,7 @@
             <a:r>
               <a:rPr lang="en-US" sz="1600" dirty="0" smtClean="0">
                 <a:solidFill>
-                  <a:srgbClr val="FFFFFF"/>
+                  <a:srgbClr val="FF0000"/>
                 </a:solidFill>
                 <a:latin typeface="Avenir Book" charset="0"/>
                 <a:ea typeface="Avenir Book" charset="0"/>
@@ -9183,7 +9164,7 @@
             </a:r>
             <a:endParaRPr lang="en-US" sz="1600" b="1" dirty="0">
               <a:solidFill>
-                <a:srgbClr val="FFFFFF"/>
+                <a:srgbClr val="FF0000"/>
               </a:solidFill>
               <a:latin typeface="Avenir Book" charset="0"/>
               <a:ea typeface="Avenir Book" charset="0"/>
@@ -9862,7 +9843,7 @@
             <a:r>
               <a:rPr lang="en-US" sz="1600" dirty="0" smtClean="0">
                 <a:solidFill>
-                  <a:srgbClr val="FFFFFF"/>
+                  <a:srgbClr val="FF0000"/>
                 </a:solidFill>
                 <a:latin typeface="Avenir Book" charset="0"/>
                 <a:ea typeface="Avenir Book" charset="0"/>
@@ -9872,7 +9853,7 @@
             </a:r>
             <a:endParaRPr lang="en-US" sz="1600" b="1" dirty="0">
               <a:solidFill>
-                <a:srgbClr val="FFFFFF"/>
+                <a:srgbClr val="FF0000"/>
               </a:solidFill>
               <a:latin typeface="Avenir Book" charset="0"/>
               <a:ea typeface="Avenir Book" charset="0"/>
@@ -10695,7 +10676,7 @@
             <a:r>
               <a:rPr lang="en-US" sz="1600" dirty="0" smtClean="0">
                 <a:solidFill>
-                  <a:srgbClr val="FFFFFF"/>
+                  <a:srgbClr val="FF0000"/>
                 </a:solidFill>
                 <a:latin typeface="Avenir Book" charset="0"/>
                 <a:ea typeface="Avenir Book" charset="0"/>
@@ -10706,7 +10687,7 @@
             <a:r>
               <a:rPr lang="en-US" sz="1600" dirty="0" err="1" smtClean="0">
                 <a:solidFill>
-                  <a:srgbClr val="FFFFFF"/>
+                  <a:srgbClr val="FF0000"/>
                 </a:solidFill>
                 <a:latin typeface="Avenir Book" charset="0"/>
                 <a:ea typeface="Avenir Book" charset="0"/>
@@ -10717,7 +10698,7 @@
             <a:r>
               <a:rPr lang="en-US" sz="1600" dirty="0" smtClean="0">
                 <a:solidFill>
-                  <a:srgbClr val="FFFFFF"/>
+                  <a:srgbClr val="FF0000"/>
                 </a:solidFill>
                 <a:latin typeface="Avenir Book" charset="0"/>
                 <a:ea typeface="Avenir Book" charset="0"/>
@@ -10727,7 +10708,7 @@
             </a:r>
             <a:endParaRPr lang="en-US" sz="1600" b="1" dirty="0">
               <a:solidFill>
-                <a:srgbClr val="FFFFFF"/>
+                <a:srgbClr val="FF0000"/>
               </a:solidFill>
               <a:latin typeface="Avenir Book" charset="0"/>
               <a:ea typeface="Avenir Book" charset="0"/>
@@ -10813,7 +10794,7 @@
           <p:cNvPr id="14" name="Oval 13">
             <a:extLst>
               <a:ext uri="{FF2B5EF4-FFF2-40B4-BE49-F238E27FC236}">
-                <a16:creationId xmlns:a16="http://schemas.microsoft.com/office/drawing/2014/main" xmlns="" id="{D79BB1CE-39DB-BB49-A501-C6EFD2590B3E}"/>
+                <a16:creationId xmlns="" xmlns:a16="http://schemas.microsoft.com/office/drawing/2014/main" id="{D79BB1CE-39DB-BB49-A501-C6EFD2590B3E}"/>
               </a:ext>
             </a:extLst>
           </p:cNvPr>
@@ -10867,7 +10848,7 @@
           <p:cNvPr id="15" name="TextBox 14">
             <a:extLst>
               <a:ext uri="{FF2B5EF4-FFF2-40B4-BE49-F238E27FC236}">
-                <a16:creationId xmlns:a16="http://schemas.microsoft.com/office/drawing/2014/main" xmlns="" id="{549D0D24-412B-7248-8FF0-F05F9C55085D}"/>
+                <a16:creationId xmlns="" xmlns:a16="http://schemas.microsoft.com/office/drawing/2014/main" id="{549D0D24-412B-7248-8FF0-F05F9C55085D}"/>
               </a:ext>
             </a:extLst>
           </p:cNvPr>
@@ -10904,7 +10885,7 @@
           <p:cNvPr id="17" name="Oval 16">
             <a:extLst>
               <a:ext uri="{FF2B5EF4-FFF2-40B4-BE49-F238E27FC236}">
-                <a16:creationId xmlns:a16="http://schemas.microsoft.com/office/drawing/2014/main" xmlns="" id="{AC3A3EC1-2396-B943-9A2D-48335F761392}"/>
+                <a16:creationId xmlns="" xmlns:a16="http://schemas.microsoft.com/office/drawing/2014/main" id="{AC3A3EC1-2396-B943-9A2D-48335F761392}"/>
               </a:ext>
             </a:extLst>
           </p:cNvPr>
@@ -10958,7 +10939,7 @@
           <p:cNvPr id="18" name="TextBox 17">
             <a:extLst>
               <a:ext uri="{FF2B5EF4-FFF2-40B4-BE49-F238E27FC236}">
-                <a16:creationId xmlns:a16="http://schemas.microsoft.com/office/drawing/2014/main" xmlns="" id="{9387BF14-286E-9147-8AFD-F2A31BFA281B}"/>
+                <a16:creationId xmlns="" xmlns:a16="http://schemas.microsoft.com/office/drawing/2014/main" id="{9387BF14-286E-9147-8AFD-F2A31BFA281B}"/>
               </a:ext>
             </a:extLst>
           </p:cNvPr>

</xml_diff>